<commit_message>
Adjusted theme colors and imported new background into .pbix
</commit_message>
<xml_diff>
--- a/Projects/Market_Research/background_template.pptx
+++ b/Projects/Market_Research/background_template.pptx
@@ -8,6 +8,7 @@
     <p:sldId id="256" r:id="rId2"/>
     <p:sldId id="257" r:id="rId3"/>
     <p:sldId id="258" r:id="rId4"/>
+    <p:sldId id="259" r:id="rId5"/>
   </p:sldIdLst>
   <p:sldSz cx="12192000" cy="6858000"/>
   <p:notesSz cx="6858000" cy="9144000"/>
@@ -9268,6 +9269,439 @@
 </p:sld>
 </file>
 
+<file path=ppt/slides/slide4.xml><?xml version="1.0" encoding="utf-8"?>
+<p:sld xmlns:a="http://schemas.openxmlformats.org/drawingml/2006/main" xmlns:r="http://schemas.openxmlformats.org/officeDocument/2006/relationships" xmlns:p="http://schemas.openxmlformats.org/presentationml/2006/main">
+  <p:cSld>
+    <p:bg>
+      <p:bgPr>
+        <a:solidFill>
+          <a:schemeClr val="bg1">
+            <a:lumMod val="85000"/>
+            <a:lumOff val="15000"/>
+          </a:schemeClr>
+        </a:solidFill>
+        <a:effectLst/>
+      </p:bgPr>
+    </p:bg>
+    <p:spTree>
+      <p:nvGrpSpPr>
+        <p:cNvPr id="1" name=""/>
+        <p:cNvGrpSpPr/>
+        <p:nvPr/>
+      </p:nvGrpSpPr>
+      <p:grpSpPr>
+        <a:xfrm>
+          <a:off x="0" y="0"/>
+          <a:ext cx="0" cy="0"/>
+          <a:chOff x="0" y="0"/>
+          <a:chExt cx="0" cy="0"/>
+        </a:xfrm>
+      </p:grpSpPr>
+      <p:sp>
+        <p:nvSpPr>
+          <p:cNvPr id="4" name="Rectangle 3">
+            <a:extLst>
+              <a:ext uri="{FF2B5EF4-FFF2-40B4-BE49-F238E27FC236}">
+                <a16:creationId xmlns:a16="http://schemas.microsoft.com/office/drawing/2014/main" id="{12AB31F2-7AA8-5700-05FA-F419B8ABE27F}"/>
+              </a:ext>
+            </a:extLst>
+          </p:cNvPr>
+          <p:cNvSpPr/>
+          <p:nvPr/>
+        </p:nvSpPr>
+        <p:spPr>
+          <a:xfrm>
+            <a:off x="7684679" y="2756326"/>
+            <a:ext cx="1342238" cy="1191237"/>
+          </a:xfrm>
+          <a:prstGeom prst="rect">
+            <a:avLst/>
+          </a:prstGeom>
+          <a:solidFill>
+            <a:schemeClr val="accent4"/>
+          </a:solidFill>
+        </p:spPr>
+        <p:style>
+          <a:lnRef idx="2">
+            <a:schemeClr val="accent1">
+              <a:shade val="15000"/>
+            </a:schemeClr>
+          </a:lnRef>
+          <a:fillRef idx="1">
+            <a:schemeClr val="accent1"/>
+          </a:fillRef>
+          <a:effectRef idx="0">
+            <a:schemeClr val="accent1"/>
+          </a:effectRef>
+          <a:fontRef idx="minor">
+            <a:schemeClr val="lt1"/>
+          </a:fontRef>
+        </p:style>
+        <p:txBody>
+          <a:bodyPr rtlCol="0" anchor="ctr"/>
+          <a:lstStyle/>
+          <a:p>
+            <a:pPr algn="ctr"/>
+            <a:endParaRPr lang="en-US"/>
+          </a:p>
+        </p:txBody>
+      </p:sp>
+      <p:sp>
+        <p:nvSpPr>
+          <p:cNvPr id="6" name="Rectangle 5">
+            <a:extLst>
+              <a:ext uri="{FF2B5EF4-FFF2-40B4-BE49-F238E27FC236}">
+                <a16:creationId xmlns:a16="http://schemas.microsoft.com/office/drawing/2014/main" id="{963B75EE-D162-0E46-B923-455B4E6FFDC7}"/>
+              </a:ext>
+            </a:extLst>
+          </p:cNvPr>
+          <p:cNvSpPr/>
+          <p:nvPr/>
+        </p:nvSpPr>
+        <p:spPr>
+          <a:xfrm>
+            <a:off x="10697748" y="2756326"/>
+            <a:ext cx="1342238" cy="1191237"/>
+          </a:xfrm>
+          <a:prstGeom prst="rect">
+            <a:avLst/>
+          </a:prstGeom>
+          <a:solidFill>
+            <a:schemeClr val="accent6"/>
+          </a:solidFill>
+        </p:spPr>
+        <p:style>
+          <a:lnRef idx="2">
+            <a:schemeClr val="accent1">
+              <a:shade val="15000"/>
+            </a:schemeClr>
+          </a:lnRef>
+          <a:fillRef idx="1">
+            <a:schemeClr val="accent1"/>
+          </a:fillRef>
+          <a:effectRef idx="0">
+            <a:schemeClr val="accent1"/>
+          </a:effectRef>
+          <a:fontRef idx="minor">
+            <a:schemeClr val="lt1"/>
+          </a:fontRef>
+        </p:style>
+        <p:txBody>
+          <a:bodyPr rtlCol="0" anchor="ctr"/>
+          <a:lstStyle/>
+          <a:p>
+            <a:pPr algn="ctr"/>
+            <a:endParaRPr lang="en-US"/>
+          </a:p>
+        </p:txBody>
+      </p:sp>
+      <p:sp>
+        <p:nvSpPr>
+          <p:cNvPr id="7" name="Rectangle 6">
+            <a:extLst>
+              <a:ext uri="{FF2B5EF4-FFF2-40B4-BE49-F238E27FC236}">
+                <a16:creationId xmlns:a16="http://schemas.microsoft.com/office/drawing/2014/main" id="{006F778E-8C58-7724-994C-75EFE251781F}"/>
+              </a:ext>
+            </a:extLst>
+          </p:cNvPr>
+          <p:cNvSpPr/>
+          <p:nvPr/>
+        </p:nvSpPr>
+        <p:spPr>
+          <a:xfrm>
+            <a:off x="152014" y="2756326"/>
+            <a:ext cx="1342238" cy="1191237"/>
+          </a:xfrm>
+          <a:prstGeom prst="rect">
+            <a:avLst/>
+          </a:prstGeom>
+          <a:solidFill>
+            <a:schemeClr val="bg2"/>
+          </a:solidFill>
+        </p:spPr>
+        <p:style>
+          <a:lnRef idx="2">
+            <a:schemeClr val="accent1">
+              <a:shade val="15000"/>
+            </a:schemeClr>
+          </a:lnRef>
+          <a:fillRef idx="1">
+            <a:schemeClr val="accent1"/>
+          </a:fillRef>
+          <a:effectRef idx="0">
+            <a:schemeClr val="accent1"/>
+          </a:effectRef>
+          <a:fontRef idx="minor">
+            <a:schemeClr val="lt1"/>
+          </a:fontRef>
+        </p:style>
+        <p:txBody>
+          <a:bodyPr rtlCol="0" anchor="ctr"/>
+          <a:lstStyle/>
+          <a:p>
+            <a:pPr algn="ctr"/>
+            <a:endParaRPr lang="en-US" dirty="0"/>
+          </a:p>
+        </p:txBody>
+      </p:sp>
+      <p:sp>
+        <p:nvSpPr>
+          <p:cNvPr id="8" name="Rectangle 7">
+            <a:extLst>
+              <a:ext uri="{FF2B5EF4-FFF2-40B4-BE49-F238E27FC236}">
+                <a16:creationId xmlns:a16="http://schemas.microsoft.com/office/drawing/2014/main" id="{D417535D-C15C-75F1-05F3-0A4DD791880C}"/>
+              </a:ext>
+            </a:extLst>
+          </p:cNvPr>
+          <p:cNvSpPr/>
+          <p:nvPr/>
+        </p:nvSpPr>
+        <p:spPr>
+          <a:xfrm>
+            <a:off x="4671613" y="2756326"/>
+            <a:ext cx="1342238" cy="1191237"/>
+          </a:xfrm>
+          <a:prstGeom prst="rect">
+            <a:avLst/>
+          </a:prstGeom>
+          <a:solidFill>
+            <a:schemeClr val="accent2"/>
+          </a:solidFill>
+        </p:spPr>
+        <p:style>
+          <a:lnRef idx="2">
+            <a:schemeClr val="accent1">
+              <a:shade val="15000"/>
+            </a:schemeClr>
+          </a:lnRef>
+          <a:fillRef idx="1">
+            <a:schemeClr val="accent1"/>
+          </a:fillRef>
+          <a:effectRef idx="0">
+            <a:schemeClr val="accent1"/>
+          </a:effectRef>
+          <a:fontRef idx="minor">
+            <a:schemeClr val="lt1"/>
+          </a:fontRef>
+        </p:style>
+        <p:txBody>
+          <a:bodyPr rtlCol="0" anchor="ctr"/>
+          <a:lstStyle/>
+          <a:p>
+            <a:pPr algn="ctr"/>
+            <a:endParaRPr lang="en-US"/>
+          </a:p>
+        </p:txBody>
+      </p:sp>
+      <p:sp>
+        <p:nvSpPr>
+          <p:cNvPr id="9" name="Rectangle 8">
+            <a:extLst>
+              <a:ext uri="{FF2B5EF4-FFF2-40B4-BE49-F238E27FC236}">
+                <a16:creationId xmlns:a16="http://schemas.microsoft.com/office/drawing/2014/main" id="{74A30959-7970-2745-0B83-8F029B7FF15D}"/>
+              </a:ext>
+            </a:extLst>
+          </p:cNvPr>
+          <p:cNvSpPr/>
+          <p:nvPr/>
+        </p:nvSpPr>
+        <p:spPr>
+          <a:xfrm>
+            <a:off x="6178146" y="2756326"/>
+            <a:ext cx="1342238" cy="1191237"/>
+          </a:xfrm>
+          <a:prstGeom prst="rect">
+            <a:avLst/>
+          </a:prstGeom>
+          <a:solidFill>
+            <a:schemeClr val="accent3"/>
+          </a:solidFill>
+        </p:spPr>
+        <p:style>
+          <a:lnRef idx="2">
+            <a:schemeClr val="accent1">
+              <a:shade val="15000"/>
+            </a:schemeClr>
+          </a:lnRef>
+          <a:fillRef idx="1">
+            <a:schemeClr val="accent1"/>
+          </a:fillRef>
+          <a:effectRef idx="0">
+            <a:schemeClr val="accent1"/>
+          </a:effectRef>
+          <a:fontRef idx="minor">
+            <a:schemeClr val="lt1"/>
+          </a:fontRef>
+        </p:style>
+        <p:txBody>
+          <a:bodyPr rtlCol="0" anchor="ctr"/>
+          <a:lstStyle/>
+          <a:p>
+            <a:pPr algn="ctr"/>
+            <a:endParaRPr lang="en-US"/>
+          </a:p>
+        </p:txBody>
+      </p:sp>
+      <p:sp>
+        <p:nvSpPr>
+          <p:cNvPr id="10" name="Rectangle 9">
+            <a:extLst>
+              <a:ext uri="{FF2B5EF4-FFF2-40B4-BE49-F238E27FC236}">
+                <a16:creationId xmlns:a16="http://schemas.microsoft.com/office/drawing/2014/main" id="{5912A54F-6A8A-CCBC-CFB9-40A43A620512}"/>
+              </a:ext>
+            </a:extLst>
+          </p:cNvPr>
+          <p:cNvSpPr/>
+          <p:nvPr/>
+        </p:nvSpPr>
+        <p:spPr>
+          <a:xfrm>
+            <a:off x="3165080" y="2756326"/>
+            <a:ext cx="1342238" cy="1191237"/>
+          </a:xfrm>
+          <a:prstGeom prst="rect">
+            <a:avLst/>
+          </a:prstGeom>
+          <a:solidFill>
+            <a:schemeClr val="accent1"/>
+          </a:solidFill>
+        </p:spPr>
+        <p:style>
+          <a:lnRef idx="2">
+            <a:schemeClr val="accent1">
+              <a:shade val="15000"/>
+            </a:schemeClr>
+          </a:lnRef>
+          <a:fillRef idx="1">
+            <a:schemeClr val="accent1"/>
+          </a:fillRef>
+          <a:effectRef idx="0">
+            <a:schemeClr val="accent1"/>
+          </a:effectRef>
+          <a:fontRef idx="minor">
+            <a:schemeClr val="lt1"/>
+          </a:fontRef>
+        </p:style>
+        <p:txBody>
+          <a:bodyPr rtlCol="0" anchor="ctr"/>
+          <a:lstStyle/>
+          <a:p>
+            <a:pPr algn="ctr"/>
+            <a:endParaRPr lang="en-US"/>
+          </a:p>
+        </p:txBody>
+      </p:sp>
+      <p:sp>
+        <p:nvSpPr>
+          <p:cNvPr id="11" name="Rectangle 10">
+            <a:extLst>
+              <a:ext uri="{FF2B5EF4-FFF2-40B4-BE49-F238E27FC236}">
+                <a16:creationId xmlns:a16="http://schemas.microsoft.com/office/drawing/2014/main" id="{9BBFD7F5-6FC4-6FEA-45D1-3E14FB5FD9A4}"/>
+              </a:ext>
+            </a:extLst>
+          </p:cNvPr>
+          <p:cNvSpPr/>
+          <p:nvPr/>
+        </p:nvSpPr>
+        <p:spPr>
+          <a:xfrm>
+            <a:off x="1658547" y="2756326"/>
+            <a:ext cx="1342238" cy="1191237"/>
+          </a:xfrm>
+          <a:prstGeom prst="rect">
+            <a:avLst/>
+          </a:prstGeom>
+          <a:solidFill>
+            <a:schemeClr val="tx2"/>
+          </a:solidFill>
+        </p:spPr>
+        <p:style>
+          <a:lnRef idx="2">
+            <a:schemeClr val="accent1">
+              <a:shade val="15000"/>
+            </a:schemeClr>
+          </a:lnRef>
+          <a:fillRef idx="1">
+            <a:schemeClr val="accent1"/>
+          </a:fillRef>
+          <a:effectRef idx="0">
+            <a:schemeClr val="accent1"/>
+          </a:effectRef>
+          <a:fontRef idx="minor">
+            <a:schemeClr val="lt1"/>
+          </a:fontRef>
+        </p:style>
+        <p:txBody>
+          <a:bodyPr rtlCol="0" anchor="ctr"/>
+          <a:lstStyle/>
+          <a:p>
+            <a:pPr algn="ctr"/>
+            <a:endParaRPr lang="en-US"/>
+          </a:p>
+        </p:txBody>
+      </p:sp>
+      <p:sp>
+        <p:nvSpPr>
+          <p:cNvPr id="13" name="Rectangle 12">
+            <a:extLst>
+              <a:ext uri="{FF2B5EF4-FFF2-40B4-BE49-F238E27FC236}">
+                <a16:creationId xmlns:a16="http://schemas.microsoft.com/office/drawing/2014/main" id="{0C680946-9013-A61D-ABA3-A2399FEDD1A6}"/>
+              </a:ext>
+            </a:extLst>
+          </p:cNvPr>
+          <p:cNvSpPr/>
+          <p:nvPr/>
+        </p:nvSpPr>
+        <p:spPr>
+          <a:xfrm>
+            <a:off x="9191212" y="2756326"/>
+            <a:ext cx="1342238" cy="1191237"/>
+          </a:xfrm>
+          <a:prstGeom prst="rect">
+            <a:avLst/>
+          </a:prstGeom>
+          <a:solidFill>
+            <a:schemeClr val="accent5"/>
+          </a:solidFill>
+        </p:spPr>
+        <p:style>
+          <a:lnRef idx="2">
+            <a:schemeClr val="accent1">
+              <a:shade val="15000"/>
+            </a:schemeClr>
+          </a:lnRef>
+          <a:fillRef idx="1">
+            <a:schemeClr val="accent1"/>
+          </a:fillRef>
+          <a:effectRef idx="0">
+            <a:schemeClr val="accent1"/>
+          </a:effectRef>
+          <a:fontRef idx="minor">
+            <a:schemeClr val="lt1"/>
+          </a:fontRef>
+        </p:style>
+        <p:txBody>
+          <a:bodyPr rtlCol="0" anchor="ctr"/>
+          <a:lstStyle/>
+          <a:p>
+            <a:pPr algn="ctr"/>
+            <a:endParaRPr lang="en-US"/>
+          </a:p>
+        </p:txBody>
+      </p:sp>
+    </p:spTree>
+    <p:extLst>
+      <p:ext uri="{BB962C8B-B14F-4D97-AF65-F5344CB8AC3E}">
+        <p14:creationId xmlns:p14="http://schemas.microsoft.com/office/powerpoint/2010/main" val="3570887236"/>
+      </p:ext>
+    </p:extLst>
+  </p:cSld>
+  <p:clrMapOvr>
+    <a:masterClrMapping/>
+  </p:clrMapOvr>
+</p:sld>
+</file>
+
 <file path=ppt/theme/theme1.xml><?xml version="1.0" encoding="utf-8"?>
 <a:theme xmlns:a="http://schemas.openxmlformats.org/drawingml/2006/main" name="Depth">
   <a:themeElements>

</xml_diff>

<commit_message>
Finished Campaign Performance section
</commit_message>
<xml_diff>
--- a/Projects/Market_Research/background_template.pptx
+++ b/Projects/Market_Research/background_template.pptx
@@ -9311,7 +9311,7 @@
         </p:nvSpPr>
         <p:spPr>
           <a:xfrm>
-            <a:off x="7684679" y="2756326"/>
+            <a:off x="7709846" y="608744"/>
             <a:ext cx="1342238" cy="1191237"/>
           </a:xfrm>
           <a:prstGeom prst="rect">
@@ -9360,7 +9360,7 @@
         </p:nvSpPr>
         <p:spPr>
           <a:xfrm>
-            <a:off x="10697748" y="2756326"/>
+            <a:off x="10722915" y="608744"/>
             <a:ext cx="1342238" cy="1191237"/>
           </a:xfrm>
           <a:prstGeom prst="rect">
@@ -9409,7 +9409,7 @@
         </p:nvSpPr>
         <p:spPr>
           <a:xfrm>
-            <a:off x="152014" y="2756326"/>
+            <a:off x="177181" y="608744"/>
             <a:ext cx="1342238" cy="1191237"/>
           </a:xfrm>
           <a:prstGeom prst="rect">
@@ -9458,7 +9458,7 @@
         </p:nvSpPr>
         <p:spPr>
           <a:xfrm>
-            <a:off x="4671613" y="2756326"/>
+            <a:off x="4696780" y="608744"/>
             <a:ext cx="1342238" cy="1191237"/>
           </a:xfrm>
           <a:prstGeom prst="rect">
@@ -9507,7 +9507,7 @@
         </p:nvSpPr>
         <p:spPr>
           <a:xfrm>
-            <a:off x="6178146" y="2756326"/>
+            <a:off x="6203313" y="608744"/>
             <a:ext cx="1342238" cy="1191237"/>
           </a:xfrm>
           <a:prstGeom prst="rect">
@@ -9556,7 +9556,7 @@
         </p:nvSpPr>
         <p:spPr>
           <a:xfrm>
-            <a:off x="3165080" y="2756326"/>
+            <a:off x="3190247" y="608744"/>
             <a:ext cx="1342238" cy="1191237"/>
           </a:xfrm>
           <a:prstGeom prst="rect">
@@ -9605,7 +9605,7 @@
         </p:nvSpPr>
         <p:spPr>
           <a:xfrm>
-            <a:off x="1658547" y="2756326"/>
+            <a:off x="1683714" y="608744"/>
             <a:ext cx="1342238" cy="1191237"/>
           </a:xfrm>
           <a:prstGeom prst="rect">
@@ -9654,7 +9654,7 @@
         </p:nvSpPr>
         <p:spPr>
           <a:xfrm>
-            <a:off x="9191212" y="2756326"/>
+            <a:off x="9216379" y="608744"/>
             <a:ext cx="1342238" cy="1191237"/>
           </a:xfrm>
           <a:prstGeom prst="rect">
@@ -9689,6 +9689,486 @@
           </a:p>
         </p:txBody>
       </p:sp>
+      <p:pic>
+        <p:nvPicPr>
+          <p:cNvPr id="3" name="Picture 2">
+            <a:extLst>
+              <a:ext uri="{FF2B5EF4-FFF2-40B4-BE49-F238E27FC236}">
+                <a16:creationId xmlns:a16="http://schemas.microsoft.com/office/drawing/2014/main" id="{2028A288-529C-52B5-5EBC-5CD5E72B3476}"/>
+              </a:ext>
+            </a:extLst>
+          </p:cNvPr>
+          <p:cNvPicPr>
+            <a:picLocks noChangeAspect="1"/>
+          </p:cNvPicPr>
+          <p:nvPr/>
+        </p:nvPicPr>
+        <p:blipFill>
+          <a:blip r:embed="rId2">
+            <a:extLst>
+              <a:ext uri="{28A0092B-C50C-407E-A947-70E740481C1C}">
+                <a14:useLocalDpi xmlns:a14="http://schemas.microsoft.com/office/drawing/2010/main" val="0"/>
+              </a:ext>
+            </a:extLst>
+          </a:blip>
+          <a:stretch>
+            <a:fillRect/>
+          </a:stretch>
+        </p:blipFill>
+        <p:spPr>
+          <a:xfrm>
+            <a:off x="1984663" y="3052700"/>
+            <a:ext cx="1008155" cy="1008155"/>
+          </a:xfrm>
+          <a:prstGeom prst="rect">
+            <a:avLst/>
+          </a:prstGeom>
+          <a:noFill/>
+          <a:effectLst>
+            <a:outerShdw blurRad="50800" dist="38100" dir="5400000" algn="t" rotWithShape="0">
+              <a:prstClr val="black">
+                <a:alpha val="40000"/>
+              </a:prstClr>
+            </a:outerShdw>
+          </a:effectLst>
+        </p:spPr>
+      </p:pic>
+      <p:pic>
+        <p:nvPicPr>
+          <p:cNvPr id="12" name="Picture 11">
+            <a:extLst>
+              <a:ext uri="{FF2B5EF4-FFF2-40B4-BE49-F238E27FC236}">
+                <a16:creationId xmlns:a16="http://schemas.microsoft.com/office/drawing/2014/main" id="{BCFAD00B-C6E5-B92C-83D7-D76A0BDE0DE7}"/>
+              </a:ext>
+            </a:extLst>
+          </p:cNvPr>
+          <p:cNvPicPr>
+            <a:picLocks noChangeAspect="1"/>
+          </p:cNvPicPr>
+          <p:nvPr/>
+        </p:nvPicPr>
+        <p:blipFill>
+          <a:blip r:embed="rId3">
+            <a:extLst>
+              <a:ext uri="{28A0092B-C50C-407E-A947-70E740481C1C}">
+                <a14:useLocalDpi xmlns:a14="http://schemas.microsoft.com/office/drawing/2010/main" val="0"/>
+              </a:ext>
+            </a:extLst>
+          </a:blip>
+          <a:stretch>
+            <a:fillRect/>
+          </a:stretch>
+        </p:blipFill>
+        <p:spPr>
+          <a:xfrm>
+            <a:off x="3289584" y="3052700"/>
+            <a:ext cx="1008155" cy="1008155"/>
+          </a:xfrm>
+          <a:prstGeom prst="rect">
+            <a:avLst/>
+          </a:prstGeom>
+          <a:noFill/>
+          <a:effectLst>
+            <a:outerShdw blurRad="50800" dist="38100" dir="5400000" algn="t" rotWithShape="0">
+              <a:prstClr val="black">
+                <a:alpha val="40000"/>
+              </a:prstClr>
+            </a:outerShdw>
+          </a:effectLst>
+        </p:spPr>
+      </p:pic>
+      <p:pic>
+        <p:nvPicPr>
+          <p:cNvPr id="19" name="Picture 18">
+            <a:extLst>
+              <a:ext uri="{FF2B5EF4-FFF2-40B4-BE49-F238E27FC236}">
+                <a16:creationId xmlns:a16="http://schemas.microsoft.com/office/drawing/2014/main" id="{12C461CD-20AD-ECE1-1E7D-8051B0E28215}"/>
+              </a:ext>
+            </a:extLst>
+          </p:cNvPr>
+          <p:cNvPicPr>
+            <a:picLocks noChangeAspect="1"/>
+          </p:cNvPicPr>
+          <p:nvPr/>
+        </p:nvPicPr>
+        <p:blipFill>
+          <a:blip r:embed="rId4">
+            <a:extLst>
+              <a:ext uri="{28A0092B-C50C-407E-A947-70E740481C1C}">
+                <a14:useLocalDpi xmlns:a14="http://schemas.microsoft.com/office/drawing/2010/main" val="0"/>
+              </a:ext>
+            </a:extLst>
+          </a:blip>
+          <a:stretch>
+            <a:fillRect/>
+          </a:stretch>
+        </p:blipFill>
+        <p:spPr>
+          <a:xfrm>
+            <a:off x="4594505" y="3052700"/>
+            <a:ext cx="1008155" cy="1008155"/>
+          </a:xfrm>
+          <a:prstGeom prst="rect">
+            <a:avLst/>
+          </a:prstGeom>
+          <a:noFill/>
+          <a:effectLst>
+            <a:outerShdw blurRad="50800" dist="38100" dir="5400000" algn="t" rotWithShape="0">
+              <a:prstClr val="black">
+                <a:alpha val="40000"/>
+              </a:prstClr>
+            </a:outerShdw>
+          </a:effectLst>
+        </p:spPr>
+      </p:pic>
+      <p:pic>
+        <p:nvPicPr>
+          <p:cNvPr id="21" name="Picture 20">
+            <a:extLst>
+              <a:ext uri="{FF2B5EF4-FFF2-40B4-BE49-F238E27FC236}">
+                <a16:creationId xmlns:a16="http://schemas.microsoft.com/office/drawing/2014/main" id="{F139A2D4-9B1B-C1B4-0C30-BCDDEC378BCE}"/>
+              </a:ext>
+            </a:extLst>
+          </p:cNvPr>
+          <p:cNvPicPr>
+            <a:picLocks noChangeAspect="1"/>
+          </p:cNvPicPr>
+          <p:nvPr/>
+        </p:nvPicPr>
+        <p:blipFill>
+          <a:blip r:embed="rId5">
+            <a:extLst>
+              <a:ext uri="{28A0092B-C50C-407E-A947-70E740481C1C}">
+                <a14:useLocalDpi xmlns:a14="http://schemas.microsoft.com/office/drawing/2010/main" val="0"/>
+              </a:ext>
+            </a:extLst>
+          </a:blip>
+          <a:stretch>
+            <a:fillRect/>
+          </a:stretch>
+        </p:blipFill>
+        <p:spPr>
+          <a:xfrm>
+            <a:off x="5899426" y="3052699"/>
+            <a:ext cx="1008156" cy="1008156"/>
+          </a:xfrm>
+          <a:prstGeom prst="rect">
+            <a:avLst/>
+          </a:prstGeom>
+          <a:noFill/>
+          <a:effectLst>
+            <a:outerShdw blurRad="50800" dist="38100" dir="5400000" algn="t" rotWithShape="0">
+              <a:prstClr val="black">
+                <a:alpha val="40000"/>
+              </a:prstClr>
+            </a:outerShdw>
+          </a:effectLst>
+        </p:spPr>
+      </p:pic>
+      <p:pic>
+        <p:nvPicPr>
+          <p:cNvPr id="23" name="Picture 22">
+            <a:extLst>
+              <a:ext uri="{FF2B5EF4-FFF2-40B4-BE49-F238E27FC236}">
+                <a16:creationId xmlns:a16="http://schemas.microsoft.com/office/drawing/2014/main" id="{FCDBA13B-3CEA-DA68-515D-1DC7801C09B2}"/>
+              </a:ext>
+            </a:extLst>
+          </p:cNvPr>
+          <p:cNvPicPr>
+            <a:picLocks noChangeAspect="1"/>
+          </p:cNvPicPr>
+          <p:nvPr/>
+        </p:nvPicPr>
+        <p:blipFill>
+          <a:blip r:embed="rId6">
+            <a:extLst>
+              <a:ext uri="{28A0092B-C50C-407E-A947-70E740481C1C}">
+                <a14:useLocalDpi xmlns:a14="http://schemas.microsoft.com/office/drawing/2010/main" val="0"/>
+              </a:ext>
+            </a:extLst>
+          </a:blip>
+          <a:stretch>
+            <a:fillRect/>
+          </a:stretch>
+        </p:blipFill>
+        <p:spPr>
+          <a:xfrm>
+            <a:off x="7204348" y="3052699"/>
+            <a:ext cx="1008156" cy="1008156"/>
+          </a:xfrm>
+          <a:prstGeom prst="rect">
+            <a:avLst/>
+          </a:prstGeom>
+          <a:noFill/>
+          <a:effectLst>
+            <a:outerShdw blurRad="50800" dist="38100" dir="5400000" algn="t" rotWithShape="0">
+              <a:prstClr val="black">
+                <a:alpha val="40000"/>
+              </a:prstClr>
+            </a:outerShdw>
+          </a:effectLst>
+        </p:spPr>
+      </p:pic>
+      <p:pic>
+        <p:nvPicPr>
+          <p:cNvPr id="25" name="Picture 24">
+            <a:extLst>
+              <a:ext uri="{FF2B5EF4-FFF2-40B4-BE49-F238E27FC236}">
+                <a16:creationId xmlns:a16="http://schemas.microsoft.com/office/drawing/2014/main" id="{513EE4D1-90AB-8AD8-3A77-5A0D42828FCF}"/>
+              </a:ext>
+            </a:extLst>
+          </p:cNvPr>
+          <p:cNvPicPr>
+            <a:picLocks noChangeAspect="1"/>
+          </p:cNvPicPr>
+          <p:nvPr/>
+        </p:nvPicPr>
+        <p:blipFill>
+          <a:blip r:embed="rId7">
+            <a:extLst>
+              <a:ext uri="{28A0092B-C50C-407E-A947-70E740481C1C}">
+                <a14:useLocalDpi xmlns:a14="http://schemas.microsoft.com/office/drawing/2010/main" val="0"/>
+              </a:ext>
+            </a:extLst>
+          </a:blip>
+          <a:stretch>
+            <a:fillRect/>
+          </a:stretch>
+        </p:blipFill>
+        <p:spPr>
+          <a:xfrm>
+            <a:off x="8509271" y="3052700"/>
+            <a:ext cx="1008155" cy="1008155"/>
+          </a:xfrm>
+          <a:prstGeom prst="rect">
+            <a:avLst/>
+          </a:prstGeom>
+          <a:noFill/>
+          <a:effectLst>
+            <a:outerShdw blurRad="50800" dist="38100" dir="5400000" algn="t" rotWithShape="0">
+              <a:prstClr val="black">
+                <a:alpha val="40000"/>
+              </a:prstClr>
+            </a:outerShdw>
+          </a:effectLst>
+        </p:spPr>
+      </p:pic>
+      <p:pic>
+        <p:nvPicPr>
+          <p:cNvPr id="27" name="Picture 26">
+            <a:extLst>
+              <a:ext uri="{FF2B5EF4-FFF2-40B4-BE49-F238E27FC236}">
+                <a16:creationId xmlns:a16="http://schemas.microsoft.com/office/drawing/2014/main" id="{7A2947BC-2998-3582-60F2-7AD0301AFE47}"/>
+              </a:ext>
+            </a:extLst>
+          </p:cNvPr>
+          <p:cNvPicPr>
+            <a:picLocks noChangeAspect="1"/>
+          </p:cNvPicPr>
+          <p:nvPr/>
+        </p:nvPicPr>
+        <p:blipFill>
+          <a:blip r:embed="rId8">
+            <a:extLst>
+              <a:ext uri="{28A0092B-C50C-407E-A947-70E740481C1C}">
+                <a14:useLocalDpi xmlns:a14="http://schemas.microsoft.com/office/drawing/2010/main" val="0"/>
+              </a:ext>
+            </a:extLst>
+          </a:blip>
+          <a:stretch>
+            <a:fillRect/>
+          </a:stretch>
+        </p:blipFill>
+        <p:spPr>
+          <a:xfrm>
+            <a:off x="9247304" y="4457493"/>
+            <a:ext cx="1106040" cy="1042943"/>
+          </a:xfrm>
+          <a:prstGeom prst="rect">
+            <a:avLst/>
+          </a:prstGeom>
+        </p:spPr>
+      </p:pic>
+      <p:pic>
+        <p:nvPicPr>
+          <p:cNvPr id="35" name="Picture 34">
+            <a:extLst>
+              <a:ext uri="{FF2B5EF4-FFF2-40B4-BE49-F238E27FC236}">
+                <a16:creationId xmlns:a16="http://schemas.microsoft.com/office/drawing/2014/main" id="{4F2A319F-33AC-1DFB-A3AC-D50D0F76F050}"/>
+              </a:ext>
+            </a:extLst>
+          </p:cNvPr>
+          <p:cNvPicPr>
+            <a:picLocks noChangeAspect="1"/>
+          </p:cNvPicPr>
+          <p:nvPr/>
+        </p:nvPicPr>
+        <p:blipFill>
+          <a:blip r:embed="rId9">
+            <a:extLst>
+              <a:ext uri="{28A0092B-C50C-407E-A947-70E740481C1C}">
+                <a14:useLocalDpi xmlns:a14="http://schemas.microsoft.com/office/drawing/2010/main" val="0"/>
+              </a:ext>
+            </a:extLst>
+          </a:blip>
+          <a:stretch>
+            <a:fillRect/>
+          </a:stretch>
+        </p:blipFill>
+        <p:spPr>
+          <a:xfrm>
+            <a:off x="7452742" y="4309199"/>
+            <a:ext cx="1233297" cy="1191237"/>
+          </a:xfrm>
+          <a:prstGeom prst="rect">
+            <a:avLst/>
+          </a:prstGeom>
+        </p:spPr>
+      </p:pic>
+      <p:pic>
+        <p:nvPicPr>
+          <p:cNvPr id="37" name="Picture 36">
+            <a:extLst>
+              <a:ext uri="{FF2B5EF4-FFF2-40B4-BE49-F238E27FC236}">
+                <a16:creationId xmlns:a16="http://schemas.microsoft.com/office/drawing/2014/main" id="{A587AEF1-DB92-3A11-2BB6-4B36A47FCEF9}"/>
+              </a:ext>
+            </a:extLst>
+          </p:cNvPr>
+          <p:cNvPicPr>
+            <a:picLocks noChangeAspect="1"/>
+          </p:cNvPicPr>
+          <p:nvPr/>
+        </p:nvPicPr>
+        <p:blipFill>
+          <a:blip r:embed="rId10">
+            <a:extLst>
+              <a:ext uri="{28A0092B-C50C-407E-A947-70E740481C1C}">
+                <a14:useLocalDpi xmlns:a14="http://schemas.microsoft.com/office/drawing/2010/main" val="0"/>
+              </a:ext>
+            </a:extLst>
+          </a:blip>
+          <a:stretch>
+            <a:fillRect/>
+          </a:stretch>
+        </p:blipFill>
+        <p:spPr>
+          <a:xfrm>
+            <a:off x="5987425" y="4192981"/>
+            <a:ext cx="1119308" cy="1342238"/>
+          </a:xfrm>
+          <a:prstGeom prst="rect">
+            <a:avLst/>
+          </a:prstGeom>
+        </p:spPr>
+      </p:pic>
+      <p:pic>
+        <p:nvPicPr>
+          <p:cNvPr id="39" name="Picture 38">
+            <a:extLst>
+              <a:ext uri="{FF2B5EF4-FFF2-40B4-BE49-F238E27FC236}">
+                <a16:creationId xmlns:a16="http://schemas.microsoft.com/office/drawing/2014/main" id="{C995248F-DECD-6D3F-9D22-6CC7E6A39ACA}"/>
+              </a:ext>
+            </a:extLst>
+          </p:cNvPr>
+          <p:cNvPicPr>
+            <a:picLocks noChangeAspect="1"/>
+          </p:cNvPicPr>
+          <p:nvPr/>
+        </p:nvPicPr>
+        <p:blipFill>
+          <a:blip r:embed="rId11">
+            <a:extLst>
+              <a:ext uri="{28A0092B-C50C-407E-A947-70E740481C1C}">
+                <a14:useLocalDpi xmlns:a14="http://schemas.microsoft.com/office/drawing/2010/main" val="0"/>
+              </a:ext>
+            </a:extLst>
+          </a:blip>
+          <a:stretch>
+            <a:fillRect/>
+          </a:stretch>
+        </p:blipFill>
+        <p:spPr>
+          <a:xfrm>
+            <a:off x="4401691" y="4457493"/>
+            <a:ext cx="1077726" cy="1077726"/>
+          </a:xfrm>
+          <a:prstGeom prst="rect">
+            <a:avLst/>
+          </a:prstGeom>
+        </p:spPr>
+      </p:pic>
+      <p:pic>
+        <p:nvPicPr>
+          <p:cNvPr id="41" name="Picture 40">
+            <a:extLst>
+              <a:ext uri="{FF2B5EF4-FFF2-40B4-BE49-F238E27FC236}">
+                <a16:creationId xmlns:a16="http://schemas.microsoft.com/office/drawing/2014/main" id="{36D0DF5D-8631-5020-89E8-1CDAD3B8D1C4}"/>
+              </a:ext>
+            </a:extLst>
+          </p:cNvPr>
+          <p:cNvPicPr>
+            <a:picLocks noChangeAspect="1"/>
+          </p:cNvPicPr>
+          <p:nvPr/>
+        </p:nvPicPr>
+        <p:blipFill>
+          <a:blip r:embed="rId12">
+            <a:extLst>
+              <a:ext uri="{28A0092B-C50C-407E-A947-70E740481C1C}">
+                <a14:useLocalDpi xmlns:a14="http://schemas.microsoft.com/office/drawing/2010/main" val="0"/>
+              </a:ext>
+            </a:extLst>
+          </a:blip>
+          <a:stretch>
+            <a:fillRect/>
+          </a:stretch>
+        </p:blipFill>
+        <p:spPr>
+          <a:xfrm>
+            <a:off x="2885527" y="4422707"/>
+            <a:ext cx="1008156" cy="1008156"/>
+          </a:xfrm>
+          <a:prstGeom prst="rect">
+            <a:avLst/>
+          </a:prstGeom>
+        </p:spPr>
+      </p:pic>
+      <p:pic>
+        <p:nvPicPr>
+          <p:cNvPr id="43" name="Picture 42">
+            <a:extLst>
+              <a:ext uri="{FF2B5EF4-FFF2-40B4-BE49-F238E27FC236}">
+                <a16:creationId xmlns:a16="http://schemas.microsoft.com/office/drawing/2014/main" id="{B4C261A7-CCF0-2733-2252-47BF941190B8}"/>
+              </a:ext>
+            </a:extLst>
+          </p:cNvPr>
+          <p:cNvPicPr>
+            <a:picLocks noChangeAspect="1"/>
+          </p:cNvPicPr>
+          <p:nvPr/>
+        </p:nvPicPr>
+        <p:blipFill>
+          <a:blip r:embed="rId13">
+            <a:extLst>
+              <a:ext uri="{28A0092B-C50C-407E-A947-70E740481C1C}">
+                <a14:useLocalDpi xmlns:a14="http://schemas.microsoft.com/office/drawing/2010/main" val="0"/>
+              </a:ext>
+            </a:extLst>
+          </a:blip>
+          <a:stretch>
+            <a:fillRect/>
+          </a:stretch>
+        </p:blipFill>
+        <p:spPr>
+          <a:xfrm>
+            <a:off x="1299793" y="4422707"/>
+            <a:ext cx="1077726" cy="1077727"/>
+          </a:xfrm>
+          <a:prstGeom prst="rect">
+            <a:avLst/>
+          </a:prstGeom>
+        </p:spPr>
+      </p:pic>
     </p:spTree>
     <p:extLst>
       <p:ext uri="{BB962C8B-B14F-4D97-AF65-F5344CB8AC3E}">

</xml_diff>

<commit_message>
Finished Buyer Composition Tab
</commit_message>
<xml_diff>
--- a/Projects/Market_Research/background_template.pptx
+++ b/Projects/Market_Research/background_template.pptx
@@ -9691,10 +9691,10 @@
       </p:sp>
       <p:pic>
         <p:nvPicPr>
-          <p:cNvPr id="3" name="Picture 2">
+          <p:cNvPr id="27" name="Picture 26">
             <a:extLst>
               <a:ext uri="{FF2B5EF4-FFF2-40B4-BE49-F238E27FC236}">
-                <a16:creationId xmlns:a16="http://schemas.microsoft.com/office/drawing/2014/main" id="{2028A288-529C-52B5-5EBC-5CD5E72B3476}"/>
+                <a16:creationId xmlns:a16="http://schemas.microsoft.com/office/drawing/2014/main" id="{7A2947BC-2998-3582-60F2-7AD0301AFE47}"/>
               </a:ext>
             </a:extLst>
           </p:cNvPr>
@@ -9717,28 +9717,20 @@
         </p:blipFill>
         <p:spPr>
           <a:xfrm>
-            <a:off x="1984663" y="3052700"/>
-            <a:ext cx="1008155" cy="1008155"/>
+            <a:off x="9340113" y="2386057"/>
+            <a:ext cx="1106040" cy="1042943"/>
           </a:xfrm>
           <a:prstGeom prst="rect">
             <a:avLst/>
           </a:prstGeom>
-          <a:noFill/>
-          <a:effectLst>
-            <a:outerShdw blurRad="50800" dist="38100" dir="5400000" algn="t" rotWithShape="0">
-              <a:prstClr val="black">
-                <a:alpha val="40000"/>
-              </a:prstClr>
-            </a:outerShdw>
-          </a:effectLst>
         </p:spPr>
       </p:pic>
       <p:pic>
         <p:nvPicPr>
-          <p:cNvPr id="12" name="Picture 11">
+          <p:cNvPr id="35" name="Picture 34">
             <a:extLst>
               <a:ext uri="{FF2B5EF4-FFF2-40B4-BE49-F238E27FC236}">
-                <a16:creationId xmlns:a16="http://schemas.microsoft.com/office/drawing/2014/main" id="{BCFAD00B-C6E5-B92C-83D7-D76A0BDE0DE7}"/>
+                <a16:creationId xmlns:a16="http://schemas.microsoft.com/office/drawing/2014/main" id="{4F2A319F-33AC-1DFB-A3AC-D50D0F76F050}"/>
               </a:ext>
             </a:extLst>
           </p:cNvPr>
@@ -9761,28 +9753,20 @@
         </p:blipFill>
         <p:spPr>
           <a:xfrm>
-            <a:off x="3289584" y="3052700"/>
-            <a:ext cx="1008155" cy="1008155"/>
+            <a:off x="7545551" y="2237763"/>
+            <a:ext cx="1233297" cy="1191237"/>
           </a:xfrm>
           <a:prstGeom prst="rect">
             <a:avLst/>
           </a:prstGeom>
-          <a:noFill/>
-          <a:effectLst>
-            <a:outerShdw blurRad="50800" dist="38100" dir="5400000" algn="t" rotWithShape="0">
-              <a:prstClr val="black">
-                <a:alpha val="40000"/>
-              </a:prstClr>
-            </a:outerShdw>
-          </a:effectLst>
         </p:spPr>
       </p:pic>
       <p:pic>
         <p:nvPicPr>
-          <p:cNvPr id="19" name="Picture 18">
+          <p:cNvPr id="37" name="Picture 36">
             <a:extLst>
               <a:ext uri="{FF2B5EF4-FFF2-40B4-BE49-F238E27FC236}">
-                <a16:creationId xmlns:a16="http://schemas.microsoft.com/office/drawing/2014/main" id="{12C461CD-20AD-ECE1-1E7D-8051B0E28215}"/>
+                <a16:creationId xmlns:a16="http://schemas.microsoft.com/office/drawing/2014/main" id="{A587AEF1-DB92-3A11-2BB6-4B36A47FCEF9}"/>
               </a:ext>
             </a:extLst>
           </p:cNvPr>
@@ -9805,28 +9789,20 @@
         </p:blipFill>
         <p:spPr>
           <a:xfrm>
-            <a:off x="4594505" y="3052700"/>
-            <a:ext cx="1008155" cy="1008155"/>
+            <a:off x="6080234" y="2121545"/>
+            <a:ext cx="1119308" cy="1342238"/>
           </a:xfrm>
           <a:prstGeom prst="rect">
             <a:avLst/>
           </a:prstGeom>
-          <a:noFill/>
-          <a:effectLst>
-            <a:outerShdw blurRad="50800" dist="38100" dir="5400000" algn="t" rotWithShape="0">
-              <a:prstClr val="black">
-                <a:alpha val="40000"/>
-              </a:prstClr>
-            </a:outerShdw>
-          </a:effectLst>
         </p:spPr>
       </p:pic>
       <p:pic>
         <p:nvPicPr>
-          <p:cNvPr id="21" name="Picture 20">
+          <p:cNvPr id="39" name="Picture 38">
             <a:extLst>
               <a:ext uri="{FF2B5EF4-FFF2-40B4-BE49-F238E27FC236}">
-                <a16:creationId xmlns:a16="http://schemas.microsoft.com/office/drawing/2014/main" id="{F139A2D4-9B1B-C1B4-0C30-BCDDEC378BCE}"/>
+                <a16:creationId xmlns:a16="http://schemas.microsoft.com/office/drawing/2014/main" id="{C995248F-DECD-6D3F-9D22-6CC7E6A39ACA}"/>
               </a:ext>
             </a:extLst>
           </p:cNvPr>
@@ -9849,28 +9825,20 @@
         </p:blipFill>
         <p:spPr>
           <a:xfrm>
-            <a:off x="5899426" y="3052699"/>
-            <a:ext cx="1008156" cy="1008156"/>
+            <a:off x="4494500" y="2386057"/>
+            <a:ext cx="1077726" cy="1077726"/>
           </a:xfrm>
           <a:prstGeom prst="rect">
             <a:avLst/>
           </a:prstGeom>
-          <a:noFill/>
-          <a:effectLst>
-            <a:outerShdw blurRad="50800" dist="38100" dir="5400000" algn="t" rotWithShape="0">
-              <a:prstClr val="black">
-                <a:alpha val="40000"/>
-              </a:prstClr>
-            </a:outerShdw>
-          </a:effectLst>
         </p:spPr>
       </p:pic>
       <p:pic>
         <p:nvPicPr>
-          <p:cNvPr id="23" name="Picture 22">
+          <p:cNvPr id="41" name="Picture 40">
             <a:extLst>
               <a:ext uri="{FF2B5EF4-FFF2-40B4-BE49-F238E27FC236}">
-                <a16:creationId xmlns:a16="http://schemas.microsoft.com/office/drawing/2014/main" id="{FCDBA13B-3CEA-DA68-515D-1DC7801C09B2}"/>
+                <a16:creationId xmlns:a16="http://schemas.microsoft.com/office/drawing/2014/main" id="{36D0DF5D-8631-5020-89E8-1CDAD3B8D1C4}"/>
               </a:ext>
             </a:extLst>
           </p:cNvPr>
@@ -9893,28 +9861,20 @@
         </p:blipFill>
         <p:spPr>
           <a:xfrm>
-            <a:off x="7204348" y="3052699"/>
+            <a:off x="2978336" y="2351271"/>
             <a:ext cx="1008156" cy="1008156"/>
           </a:xfrm>
           <a:prstGeom prst="rect">
             <a:avLst/>
           </a:prstGeom>
-          <a:noFill/>
-          <a:effectLst>
-            <a:outerShdw blurRad="50800" dist="38100" dir="5400000" algn="t" rotWithShape="0">
-              <a:prstClr val="black">
-                <a:alpha val="40000"/>
-              </a:prstClr>
-            </a:outerShdw>
-          </a:effectLst>
         </p:spPr>
       </p:pic>
       <p:pic>
         <p:nvPicPr>
-          <p:cNvPr id="25" name="Picture 24">
+          <p:cNvPr id="43" name="Picture 42">
             <a:extLst>
               <a:ext uri="{FF2B5EF4-FFF2-40B4-BE49-F238E27FC236}">
-                <a16:creationId xmlns:a16="http://schemas.microsoft.com/office/drawing/2014/main" id="{513EE4D1-90AB-8AD8-3A77-5A0D42828FCF}"/>
+                <a16:creationId xmlns:a16="http://schemas.microsoft.com/office/drawing/2014/main" id="{B4C261A7-CCF0-2733-2252-47BF941190B8}"/>
               </a:ext>
             </a:extLst>
           </p:cNvPr>
@@ -9937,28 +9897,20 @@
         </p:blipFill>
         <p:spPr>
           <a:xfrm>
-            <a:off x="8509271" y="3052700"/>
-            <a:ext cx="1008155" cy="1008155"/>
+            <a:off x="1392602" y="2351271"/>
+            <a:ext cx="1077726" cy="1077727"/>
           </a:xfrm>
           <a:prstGeom prst="rect">
             <a:avLst/>
           </a:prstGeom>
-          <a:noFill/>
-          <a:effectLst>
-            <a:outerShdw blurRad="50800" dist="38100" dir="5400000" algn="t" rotWithShape="0">
-              <a:prstClr val="black">
-                <a:alpha val="40000"/>
-              </a:prstClr>
-            </a:outerShdw>
-          </a:effectLst>
         </p:spPr>
       </p:pic>
       <p:pic>
         <p:nvPicPr>
-          <p:cNvPr id="27" name="Picture 26">
+          <p:cNvPr id="5" name="Picture 4">
             <a:extLst>
               <a:ext uri="{FF2B5EF4-FFF2-40B4-BE49-F238E27FC236}">
-                <a16:creationId xmlns:a16="http://schemas.microsoft.com/office/drawing/2014/main" id="{7A2947BC-2998-3582-60F2-7AD0301AFE47}"/>
+                <a16:creationId xmlns:a16="http://schemas.microsoft.com/office/drawing/2014/main" id="{74A87948-BFCD-74A5-4A53-CF388C70AF45}"/>
               </a:ext>
             </a:extLst>
           </p:cNvPr>
@@ -9981,8 +9933,8 @@
         </p:blipFill>
         <p:spPr>
           <a:xfrm>
-            <a:off x="9247304" y="4457493"/>
-            <a:ext cx="1106040" cy="1042943"/>
+            <a:off x="7548507" y="4243002"/>
+            <a:ext cx="634921" cy="634921"/>
           </a:xfrm>
           <a:prstGeom prst="rect">
             <a:avLst/>
@@ -9991,10 +9943,10 @@
       </p:pic>
       <p:pic>
         <p:nvPicPr>
-          <p:cNvPr id="35" name="Picture 34">
+          <p:cNvPr id="15" name="Picture 14">
             <a:extLst>
               <a:ext uri="{FF2B5EF4-FFF2-40B4-BE49-F238E27FC236}">
-                <a16:creationId xmlns:a16="http://schemas.microsoft.com/office/drawing/2014/main" id="{4F2A319F-33AC-1DFB-A3AC-D50D0F76F050}"/>
+                <a16:creationId xmlns:a16="http://schemas.microsoft.com/office/drawing/2014/main" id="{F4134BEB-78A9-44F7-B1E1-5297B09B5D51}"/>
               </a:ext>
             </a:extLst>
           </p:cNvPr>
@@ -10017,8 +9969,8 @@
         </p:blipFill>
         <p:spPr>
           <a:xfrm>
-            <a:off x="7452742" y="4309199"/>
-            <a:ext cx="1233297" cy="1191237"/>
+            <a:off x="6163120" y="4243002"/>
+            <a:ext cx="634921" cy="634921"/>
           </a:xfrm>
           <a:prstGeom prst="rect">
             <a:avLst/>
@@ -10027,10 +9979,10 @@
       </p:pic>
       <p:pic>
         <p:nvPicPr>
-          <p:cNvPr id="37" name="Picture 36">
+          <p:cNvPr id="20" name="Picture 19">
             <a:extLst>
               <a:ext uri="{FF2B5EF4-FFF2-40B4-BE49-F238E27FC236}">
-                <a16:creationId xmlns:a16="http://schemas.microsoft.com/office/drawing/2014/main" id="{A587AEF1-DB92-3A11-2BB6-4B36A47FCEF9}"/>
+                <a16:creationId xmlns:a16="http://schemas.microsoft.com/office/drawing/2014/main" id="{7137D422-C9AA-198F-4F38-3D9393CF0D8F}"/>
               </a:ext>
             </a:extLst>
           </p:cNvPr>
@@ -10053,8 +10005,8 @@
         </p:blipFill>
         <p:spPr>
           <a:xfrm>
-            <a:off x="5987425" y="4192981"/>
-            <a:ext cx="1119308" cy="1342238"/>
+            <a:off x="3249810" y="4243002"/>
+            <a:ext cx="634921" cy="634921"/>
           </a:xfrm>
           <a:prstGeom prst="rect">
             <a:avLst/>
@@ -10063,10 +10015,10 @@
       </p:pic>
       <p:pic>
         <p:nvPicPr>
-          <p:cNvPr id="39" name="Picture 38">
+          <p:cNvPr id="24" name="Picture 23">
             <a:extLst>
               <a:ext uri="{FF2B5EF4-FFF2-40B4-BE49-F238E27FC236}">
-                <a16:creationId xmlns:a16="http://schemas.microsoft.com/office/drawing/2014/main" id="{C995248F-DECD-6D3F-9D22-6CC7E6A39ACA}"/>
+                <a16:creationId xmlns:a16="http://schemas.microsoft.com/office/drawing/2014/main" id="{AB59E506-6F83-D5F7-81C1-99604462FE43}"/>
               </a:ext>
             </a:extLst>
           </p:cNvPr>
@@ -10089,8 +10041,8 @@
         </p:blipFill>
         <p:spPr>
           <a:xfrm>
-            <a:off x="4401691" y="4457493"/>
-            <a:ext cx="1077726" cy="1077726"/>
+            <a:off x="1864423" y="4243002"/>
+            <a:ext cx="634921" cy="634921"/>
           </a:xfrm>
           <a:prstGeom prst="rect">
             <a:avLst/>
@@ -10099,10 +10051,10 @@
       </p:pic>
       <p:pic>
         <p:nvPicPr>
-          <p:cNvPr id="41" name="Picture 40">
+          <p:cNvPr id="28" name="Picture 27">
             <a:extLst>
               <a:ext uri="{FF2B5EF4-FFF2-40B4-BE49-F238E27FC236}">
-                <a16:creationId xmlns:a16="http://schemas.microsoft.com/office/drawing/2014/main" id="{36D0DF5D-8631-5020-89E8-1CDAD3B8D1C4}"/>
+                <a16:creationId xmlns:a16="http://schemas.microsoft.com/office/drawing/2014/main" id="{0F2414F1-CB96-81A4-E45B-8355C404B64F}"/>
               </a:ext>
             </a:extLst>
           </p:cNvPr>
@@ -10125,8 +10077,8 @@
         </p:blipFill>
         <p:spPr>
           <a:xfrm>
-            <a:off x="2885527" y="4422707"/>
-            <a:ext cx="1008156" cy="1008156"/>
+            <a:off x="8933894" y="4243002"/>
+            <a:ext cx="634921" cy="634921"/>
           </a:xfrm>
           <a:prstGeom prst="rect">
             <a:avLst/>
@@ -10135,10 +10087,10 @@
       </p:pic>
       <p:pic>
         <p:nvPicPr>
-          <p:cNvPr id="43" name="Picture 42">
+          <p:cNvPr id="3" name="Picture 2">
             <a:extLst>
               <a:ext uri="{FF2B5EF4-FFF2-40B4-BE49-F238E27FC236}">
-                <a16:creationId xmlns:a16="http://schemas.microsoft.com/office/drawing/2014/main" id="{B4C261A7-CCF0-2733-2252-47BF941190B8}"/>
+                <a16:creationId xmlns:a16="http://schemas.microsoft.com/office/drawing/2014/main" id="{B12D9ACB-EEBA-EDF1-5CBB-F41D25FAEA57}"/>
               </a:ext>
             </a:extLst>
           </p:cNvPr>
@@ -10161,8 +10113,44 @@
         </p:blipFill>
         <p:spPr>
           <a:xfrm>
-            <a:off x="1299793" y="4422707"/>
-            <a:ext cx="1077726" cy="1077727"/>
+            <a:off x="4635197" y="4171734"/>
+            <a:ext cx="777457" cy="777457"/>
+          </a:xfrm>
+          <a:prstGeom prst="rect">
+            <a:avLst/>
+          </a:prstGeom>
+        </p:spPr>
+      </p:pic>
+      <p:pic>
+        <p:nvPicPr>
+          <p:cNvPr id="14" name="Picture 13">
+            <a:extLst>
+              <a:ext uri="{FF2B5EF4-FFF2-40B4-BE49-F238E27FC236}">
+                <a16:creationId xmlns:a16="http://schemas.microsoft.com/office/drawing/2014/main" id="{5AA987A5-9E9B-ECAA-6637-3D727C529240}"/>
+              </a:ext>
+            </a:extLst>
+          </p:cNvPr>
+          <p:cNvPicPr>
+            <a:picLocks noChangeAspect="1"/>
+          </p:cNvPicPr>
+          <p:nvPr/>
+        </p:nvPicPr>
+        <p:blipFill>
+          <a:blip r:embed="rId14">
+            <a:extLst>
+              <a:ext uri="{28A0092B-C50C-407E-A947-70E740481C1C}">
+                <a14:useLocalDpi xmlns:a14="http://schemas.microsoft.com/office/drawing/2010/main" val="0"/>
+              </a:ext>
+            </a:extLst>
+          </a:blip>
+          <a:stretch>
+            <a:fillRect/>
+          </a:stretch>
+        </p:blipFill>
+        <p:spPr>
+          <a:xfrm>
+            <a:off x="10319279" y="4243002"/>
+            <a:ext cx="634921" cy="634921"/>
           </a:xfrm>
           <a:prstGeom prst="rect">
             <a:avLst/>

</xml_diff>